<commit_message>
Added all results for dataset with 1 line (0.90,0.92,0.95,0.97,0.99)
</commit_message>
<xml_diff>
--- a/ransac_threshold_nne_distribution/Presentation1.pptx
+++ b/ransac_threshold_nne_distribution/Presentation1.pptx
@@ -3444,9 +3444,9 @@
           <p:nvPr/>
         </p:nvCxnSpPr>
         <p:spPr>
-          <a:xfrm flipV="1">
-            <a:off x="1719743" y="981508"/>
-            <a:ext cx="496241" cy="4"/>
+          <a:xfrm>
+            <a:off x="1719743" y="981512"/>
+            <a:ext cx="496241" cy="0"/>
           </a:xfrm>
           <a:prstGeom prst="straightConnector1">
             <a:avLst/>
@@ -3533,8 +3533,8 @@
         </p:nvSpPr>
         <p:spPr>
           <a:xfrm>
-            <a:off x="2215984" y="402665"/>
-            <a:ext cx="2253840" cy="1157685"/>
+            <a:off x="2215984" y="671118"/>
+            <a:ext cx="2253840" cy="620787"/>
           </a:xfrm>
           <a:prstGeom prst="flowChartProcess">
             <a:avLst/>
@@ -3564,13 +3564,6 @@
             <a:r>
               <a:rPr lang="en-GB" dirty="0"/>
               <a:t>Generate Noisy images </a:t>
-            </a:r>
-          </a:p>
-          <a:p>
-            <a:pPr algn="ctr"/>
-            <a:r>
-              <a:rPr lang="en-GB" dirty="0"/>
-              <a:t>(SaltPepperNoise.py)</a:t>
             </a:r>
           </a:p>
         </p:txBody>
@@ -3642,8 +3635,8 @@
         </p:nvCxnSpPr>
         <p:spPr>
           <a:xfrm>
-            <a:off x="4469824" y="981508"/>
-            <a:ext cx="627671" cy="4"/>
+            <a:off x="4469824" y="981512"/>
+            <a:ext cx="627671" cy="0"/>
           </a:xfrm>
           <a:prstGeom prst="straightConnector1">
             <a:avLst/>
@@ -3806,8 +3799,8 @@
         </p:nvSpPr>
         <p:spPr>
           <a:xfrm>
-            <a:off x="8997085" y="2107033"/>
-            <a:ext cx="2253840" cy="1157685"/>
+            <a:off x="8997085" y="2375483"/>
+            <a:ext cx="2253840" cy="620783"/>
           </a:xfrm>
           <a:prstGeom prst="flowChartProcess">
             <a:avLst/>
@@ -3836,14 +3829,7 @@
             <a:pPr algn="ctr"/>
             <a:r>
               <a:rPr lang="en-GB" dirty="0"/>
-              <a:t>Generate Noisy images </a:t>
-            </a:r>
-          </a:p>
-          <a:p>
-            <a:pPr algn="ctr"/>
-            <a:r>
-              <a:rPr lang="en-GB" dirty="0"/>
-              <a:t>(SaltPepperNoise.py)</a:t>
+              <a:t>Run RANSAC</a:t>
             </a:r>
           </a:p>
         </p:txBody>
@@ -3858,6 +3844,7 @@
             </a:extLst>
           </p:cNvPr>
           <p:cNvCxnSpPr>
+            <a:cxnSpLocks/>
             <a:stCxn id="20" idx="2"/>
             <a:endCxn id="28" idx="0"/>
           </p:cNvCxnSpPr>
@@ -3866,7 +3853,7 @@
         <p:spPr>
           <a:xfrm>
             <a:off x="10124005" y="1669126"/>
-            <a:ext cx="0" cy="437907"/>
+            <a:ext cx="0" cy="706357"/>
           </a:xfrm>
           <a:prstGeom prst="straightConnector1">
             <a:avLst/>

</xml_diff>